<commit_message>
updated ProblemSet1 to reflect the guest 201b accounts
</commit_message>
<xml_diff>
--- a/slides/week0_thurs.pptx
+++ b/slides/week0_thurs.pptx
@@ -4766,7 +4766,15 @@
             </a:r>
             <a:r>
               <a:rPr lang="en-US" dirty="0" smtClean="0"/>
-              <a:t>), Mercury (or Hg), </a:t>
+              <a:t>), </a:t>
+            </a:r>
+            <a:r>
+              <a:rPr lang="en-US" dirty="0" smtClean="0"/>
+              <a:t>Mercurial </a:t>
+            </a:r>
+            <a:r>
+              <a:rPr lang="en-US" dirty="0" smtClean="0"/>
+              <a:t>(or Hg), </a:t>
             </a:r>
             <a:r>
               <a:rPr lang="en-US" dirty="0" err="1"/>

</xml_diff>

<commit_message>
Stuff for week2, Thurs
</commit_message>
<xml_diff>
--- a/slides/week0_thurs.pptx
+++ b/slides/week0_thurs.pptx
@@ -211,7 +211,7 @@
             <a:fld id="{43DBBD18-6C88-F045-A73C-EAB7098132B3}" type="datetime1">
               <a:rPr lang="en-US" smtClean="0"/>
               <a:pPr/>
-              <a:t>9/23/10</a:t>
+              <a:t>9/28/10</a:t>
             </a:fld>
             <a:endParaRPr lang="en-US"/>
           </a:p>
@@ -374,7 +374,7 @@
             <a:fld id="{EAEF232E-3F8A-2D4B-A08F-882F821D32B7}" type="datetime1">
               <a:rPr lang="en-US" smtClean="0"/>
               <a:pPr/>
-              <a:t>9/23/10</a:t>
+              <a:t>9/27/10</a:t>
             </a:fld>
             <a:endParaRPr lang="en-US"/>
           </a:p>
@@ -4766,15 +4766,7 @@
             </a:r>
             <a:r>
               <a:rPr lang="en-US" dirty="0" smtClean="0"/>
-              <a:t>), </a:t>
-            </a:r>
-            <a:r>
-              <a:rPr lang="en-US" dirty="0" smtClean="0"/>
-              <a:t>Mercurial </a:t>
-            </a:r>
-            <a:r>
-              <a:rPr lang="en-US" dirty="0" smtClean="0"/>
-              <a:t>(or Hg), </a:t>
+              <a:t>), Mercurial (or Hg), </a:t>
             </a:r>
             <a:r>
               <a:rPr lang="en-US" dirty="0" err="1"/>
@@ -6920,13 +6912,17 @@
             </a:r>
             <a:r>
               <a:rPr lang="en-US" dirty="0" smtClean="0"/>
-              <a:t>			recursively list all files in </a:t>
-            </a:r>
-            <a:r>
-              <a:rPr lang="en-US" dirty="0" err="1" smtClean="0"/>
+              <a:t>			</a:t>
+            </a:r>
+            <a:r>
+              <a:rPr lang="en-US" i="1" dirty="0" smtClean="0"/>
+              <a:t>recursively list all files in </a:t>
+            </a:r>
+            <a:r>
+              <a:rPr lang="en-US" i="1" dirty="0" err="1" smtClean="0"/>
               <a:t>mydir</a:t>
             </a:r>
-            <a:endParaRPr lang="en-US" dirty="0" smtClean="0"/>
+            <a:endParaRPr lang="en-US" i="1" dirty="0" smtClean="0"/>
           </a:p>
           <a:p>
             <a:endParaRPr lang="en-US" dirty="0" smtClean="0"/>

</xml_diff>